<commit_message>
Baruch - 20:02 13/6
</commit_message>
<xml_diff>
--- a/presentation.pptx
+++ b/presentation.pptx
@@ -111,7 +111,16 @@
       </a:defRPr>
     </a:lvl9pPr>
   </p:defaultTextStyle>
+  <p:extLst>
+    <p:ext uri="{EFAFB233-063F-42B5-8137-9DF3F51BA10A}">
+      <p15:sldGuideLst xmlns:p15="http://schemas.microsoft.com/office/powerpoint/2012/main"/>
+    </p:ext>
+  </p:extLst>
 </p:presentation>
+</file>
+
+<file path=ppt/revisionInfo.xml><?xml version="1.0" encoding="utf-8"?>
+<p1510:revInfo xmlns:a="http://schemas.openxmlformats.org/drawingml/2006/main" xmlns:r="http://schemas.openxmlformats.org/officeDocument/2006/relationships" xmlns:p1510="http://schemas.microsoft.com/office/powerpoint/2015/10/main"/>
 </file>
 
 <file path=ppt/notesMasters/notesMaster1.xml><?xml version="1.0" encoding="utf-8"?>
@@ -196,7 +205,7 @@
           <a:p>
             <a:fld id="{A580F231-D6C1-46FE-BB12-C1D6E54C7F64}" type="datetimeFigureOut">
               <a:rPr lang="en-US" smtClean="0"/>
-              <a:t>13-Jun-17</a:t>
+              <a:t>6/13/2017</a:t>
             </a:fld>
             <a:endParaRPr lang="en-US"/>
           </a:p>
@@ -613,7 +622,7 @@
           <a:p>
             <a:fld id="{3CDEC65A-793D-48D9-A90D-089CA926FEAD}" type="datetimeFigureOut">
               <a:rPr lang="en-US" smtClean="0"/>
-              <a:t>13-Jun-17</a:t>
+              <a:t>6/13/2017</a:t>
             </a:fld>
             <a:endParaRPr lang="en-US"/>
           </a:p>
@@ -813,7 +822,7 @@
           <a:p>
             <a:fld id="{3CDEC65A-793D-48D9-A90D-089CA926FEAD}" type="datetimeFigureOut">
               <a:rPr lang="en-US" smtClean="0"/>
-              <a:t>13-Jun-17</a:t>
+              <a:t>6/13/2017</a:t>
             </a:fld>
             <a:endParaRPr lang="en-US"/>
           </a:p>
@@ -1023,7 +1032,7 @@
           <a:p>
             <a:fld id="{3CDEC65A-793D-48D9-A90D-089CA926FEAD}" type="datetimeFigureOut">
               <a:rPr lang="en-US" smtClean="0"/>
-              <a:t>13-Jun-17</a:t>
+              <a:t>6/13/2017</a:t>
             </a:fld>
             <a:endParaRPr lang="en-US"/>
           </a:p>
@@ -1223,7 +1232,7 @@
           <a:p>
             <a:fld id="{3CDEC65A-793D-48D9-A90D-089CA926FEAD}" type="datetimeFigureOut">
               <a:rPr lang="en-US" smtClean="0"/>
-              <a:t>13-Jun-17</a:t>
+              <a:t>6/13/2017</a:t>
             </a:fld>
             <a:endParaRPr lang="en-US"/>
           </a:p>
@@ -1499,7 +1508,7 @@
           <a:p>
             <a:fld id="{3CDEC65A-793D-48D9-A90D-089CA926FEAD}" type="datetimeFigureOut">
               <a:rPr lang="en-US" smtClean="0"/>
-              <a:t>13-Jun-17</a:t>
+              <a:t>6/13/2017</a:t>
             </a:fld>
             <a:endParaRPr lang="en-US"/>
           </a:p>
@@ -1767,7 +1776,7 @@
           <a:p>
             <a:fld id="{3CDEC65A-793D-48D9-A90D-089CA926FEAD}" type="datetimeFigureOut">
               <a:rPr lang="en-US" smtClean="0"/>
-              <a:t>13-Jun-17</a:t>
+              <a:t>6/13/2017</a:t>
             </a:fld>
             <a:endParaRPr lang="en-US"/>
           </a:p>
@@ -2182,7 +2191,7 @@
           <a:p>
             <a:fld id="{3CDEC65A-793D-48D9-A90D-089CA926FEAD}" type="datetimeFigureOut">
               <a:rPr lang="en-US" smtClean="0"/>
-              <a:t>13-Jun-17</a:t>
+              <a:t>6/13/2017</a:t>
             </a:fld>
             <a:endParaRPr lang="en-US"/>
           </a:p>
@@ -2324,7 +2333,7 @@
           <a:p>
             <a:fld id="{3CDEC65A-793D-48D9-A90D-089CA926FEAD}" type="datetimeFigureOut">
               <a:rPr lang="en-US" smtClean="0"/>
-              <a:t>13-Jun-17</a:t>
+              <a:t>6/13/2017</a:t>
             </a:fld>
             <a:endParaRPr lang="en-US"/>
           </a:p>
@@ -2437,7 +2446,7 @@
           <a:p>
             <a:fld id="{3CDEC65A-793D-48D9-A90D-089CA926FEAD}" type="datetimeFigureOut">
               <a:rPr lang="en-US" smtClean="0"/>
-              <a:t>13-Jun-17</a:t>
+              <a:t>6/13/2017</a:t>
             </a:fld>
             <a:endParaRPr lang="en-US"/>
           </a:p>
@@ -2750,7 +2759,7 @@
           <a:p>
             <a:fld id="{3CDEC65A-793D-48D9-A90D-089CA926FEAD}" type="datetimeFigureOut">
               <a:rPr lang="en-US" smtClean="0"/>
-              <a:t>13-Jun-17</a:t>
+              <a:t>6/13/2017</a:t>
             </a:fld>
             <a:endParaRPr lang="en-US"/>
           </a:p>
@@ -3039,7 +3048,7 @@
           <a:p>
             <a:fld id="{3CDEC65A-793D-48D9-A90D-089CA926FEAD}" type="datetimeFigureOut">
               <a:rPr lang="en-US" smtClean="0"/>
-              <a:t>13-Jun-17</a:t>
+              <a:t>6/13/2017</a:t>
             </a:fld>
             <a:endParaRPr lang="en-US"/>
           </a:p>
@@ -3282,7 +3291,7 @@
           <a:p>
             <a:fld id="{3CDEC65A-793D-48D9-A90D-089CA926FEAD}" type="datetimeFigureOut">
               <a:rPr lang="en-US" smtClean="0"/>
-              <a:t>13-Jun-17</a:t>
+              <a:t>6/13/2017</a:t>
             </a:fld>
             <a:endParaRPr lang="en-US"/>
           </a:p>
@@ -4197,8 +4206,8 @@
         </p:nvSpPr>
         <p:spPr>
           <a:xfrm>
-            <a:off x="1003275" y="261842"/>
-            <a:ext cx="9808391" cy="923330"/>
+            <a:off x="3705745" y="261842"/>
+            <a:ext cx="4403450" cy="923330"/>
           </a:xfrm>
           <a:prstGeom prst="rect">
             <a:avLst/>
@@ -4228,22 +4237,19 @@
               </a:rPr>
               <a:t>Gene Ontology</a:t>
             </a:r>
-            <a:r>
-              <a:rPr lang="en-US" sz="5400" dirty="0">
-                <a:ln w="0"/>
-                <a:solidFill>
-                  <a:schemeClr val="accent1"/>
-                </a:solidFill>
-                <a:effectLst>
-                  <a:outerShdw blurRad="38100" dist="25400" dir="5400000" algn="ctr" rotWithShape="0">
-                    <a:srgbClr val="6E747A">
-                      <a:alpha val="43000"/>
-                    </a:srgbClr>
-                  </a:outerShdw>
-                </a:effectLst>
-              </a:rPr>
-              <a:t> annotation project</a:t>
-            </a:r>
+            <a:endParaRPr lang="en-US" sz="5400" dirty="0">
+              <a:ln w="0"/>
+              <a:solidFill>
+                <a:schemeClr val="accent1"/>
+              </a:solidFill>
+              <a:effectLst>
+                <a:outerShdw blurRad="38100" dist="25400" dir="5400000" algn="ctr" rotWithShape="0">
+                  <a:srgbClr val="6E747A">
+                    <a:alpha val="43000"/>
+                  </a:srgbClr>
+                </a:outerShdw>
+              </a:effectLst>
+            </a:endParaRPr>
           </a:p>
         </p:txBody>
       </p:sp>
@@ -4275,18 +4281,64 @@
           </a:bodyPr>
           <a:lstStyle/>
           <a:p>
+            <a:pPr marL="285750" indent="-285750">
+              <a:buFontTx/>
+              <a:buChar char="-"/>
+            </a:pPr>
+            <a:r>
+              <a:rPr lang="en-US" dirty="0"/>
+              <a:t>GO annotations</a:t>
+            </a:r>
             <a:r>
               <a:rPr lang="he-IL" dirty="0"/>
-              <a:t>המידע מהפרויקט מכיל מאגר נתונים על הגנים האנושיים. המאגר חוזה את התוצאה של שילוב מוטציות בשני גנים. </a:t>
-            </a:r>
-          </a:p>
-          <a:p>
+              <a:t>: כל גן משויך ל</a:t>
+            </a:r>
+            <a:r>
+              <a:rPr lang="en-US" dirty="0"/>
+              <a:t>GO-terms</a:t>
+            </a:r>
             <a:r>
               <a:rPr lang="he-IL" dirty="0"/>
-              <a:t>בעזרת מאגר זה ניתן לבנות עץ, שכן כל תוצאה היא האב של שתי המוטציות תחתיו. </a:t>
-            </a:r>
-          </a:p>
-          <a:p>
+              <a:t>(אחד או יותר), בעזרת המאגר הזה נוכל לשייך כל גן מהדגימות של הפציינטים ל</a:t>
+            </a:r>
+            <a:r>
+              <a:rPr lang="en-US" dirty="0"/>
+              <a:t>GO-terms</a:t>
+            </a:r>
+            <a:r>
+              <a:rPr lang="he-IL" dirty="0"/>
+              <a:t> המתאימים לו.</a:t>
+            </a:r>
+          </a:p>
+          <a:p>
+            <a:pPr marL="285750" indent="-285750">
+              <a:buFontTx/>
+              <a:buChar char="-"/>
+            </a:pPr>
+            <a:r>
+              <a:rPr lang="en-US" dirty="0"/>
+              <a:t>GO graph</a:t>
+            </a:r>
+            <a:r>
+              <a:rPr lang="he-IL" dirty="0"/>
+              <a:t>: גרף המראה קשרי אב-בן בין </a:t>
+            </a:r>
+            <a:r>
+              <a:rPr lang="en-US" dirty="0"/>
+              <a:t>GO-terms</a:t>
+            </a:r>
+            <a:r>
+              <a:rPr lang="he-IL" dirty="0"/>
+              <a:t>, נוכל לצמצם את הגרף הזה ל</a:t>
+            </a:r>
+            <a:r>
+              <a:rPr lang="en-US" dirty="0"/>
+              <a:t>GO-terms</a:t>
+            </a:r>
+            <a:r>
+              <a:rPr lang="he-IL" dirty="0"/>
+              <a:t> הרלוונטיים עבורנו(לפי הגנים המשויכים אליהם).</a:t>
+            </a:r>
             <a:endParaRPr lang="en-US" dirty="0"/>
           </a:p>
         </p:txBody>
@@ -4336,7 +4388,7 @@
         <p:spPr>
           <a:xfrm>
             <a:off x="1318339" y="2234153"/>
-            <a:ext cx="9793034" cy="2031325"/>
+            <a:ext cx="9793034" cy="2585323"/>
           </a:xfrm>
           <a:prstGeom prst="rect">
             <a:avLst/>
@@ -4351,15 +4403,7 @@
           <a:p>
             <a:r>
               <a:rPr lang="he-IL" dirty="0"/>
-              <a:t>המידע </a:t>
-            </a:r>
-            <a:r>
-              <a:rPr lang="he-IL" dirty="0" err="1"/>
-              <a:t>ברשותינו</a:t>
-            </a:r>
-            <a:r>
-              <a:rPr lang="he-IL" dirty="0"/>
-              <a:t>:</a:t>
+              <a:t>המידע ברשותנו:</a:t>
             </a:r>
           </a:p>
           <a:p>
@@ -4373,6 +4417,46 @@
             </a:r>
             <a:r>
               <a:rPr lang="he-IL" dirty="0"/>
+              <a:t> האמתי.</a:t>
+            </a:r>
+          </a:p>
+          <a:p>
+            <a:r>
+              <a:rPr lang="he-IL" dirty="0"/>
+              <a:t>מוטציות – גנים אשר עברו מוטציות אצל מטופלים שונים בדגימות שונות. </a:t>
+            </a:r>
+          </a:p>
+          <a:p>
+            <a:endParaRPr lang="he-IL" dirty="0"/>
+          </a:p>
+          <a:p>
+            <a:endParaRPr lang="he-IL" dirty="0"/>
+          </a:p>
+          <a:p>
+            <a:r>
+              <a:rPr lang="he-IL" dirty="0"/>
+              <a:t>הצלבת המידע הנ"ל עם המידע על המטופלים מהמחקר, ייצרה לנו מסד נתונים עם וקטור של הגנים שנדגמו אצל כל מטופל עם ערך 1 אם הגן עבר מוטציה ו-0 אם לא.</a:t>
+            </a:r>
+          </a:p>
+          <a:p>
+            <a:r>
+              <a:rPr lang="he-IL" dirty="0"/>
+              <a:t>לבסוף הפעלת ה</a:t>
+            </a:r>
+            <a:r>
+              <a:rPr lang="en-US" dirty="0" err="1"/>
+              <a:t>Ontotype</a:t>
+            </a:r>
+            <a:r>
+              <a:rPr lang="he-IL" dirty="0"/>
+              <a:t> על מאגר זה ייצרה לנו את המאגר הדרוש בו כל שורה עבור דגימה המכילה גיל , מין, אורך </a:t>
+            </a:r>
+            <a:r>
+              <a:rPr lang="he-IL" dirty="0" err="1"/>
+              <a:t>הטלומר</a:t>
+            </a:r>
+            <a:r>
+              <a:rPr lang="he-IL" dirty="0"/>
               <a:t> </a:t>
             </a:r>
             <a:r>
@@ -4381,33 +4465,15 @@
             </a:r>
             <a:r>
               <a:rPr lang="he-IL" dirty="0"/>
-              <a:t>.</a:t>
-            </a:r>
-          </a:p>
-          <a:p>
+              <a:t> וקטור של </a:t>
+            </a:r>
+            <a:r>
+              <a:rPr lang="en-US" dirty="0"/>
+              <a:t>GO-terms</a:t>
+            </a:r>
             <a:r>
               <a:rPr lang="he-IL" dirty="0"/>
-              <a:t>מוטציות – גנים אשר עברו מוטציות אצל מטופלים שונים בדגימות שונות. </a:t>
-            </a:r>
-          </a:p>
-          <a:p>
-            <a:endParaRPr lang="he-IL" dirty="0"/>
-          </a:p>
-          <a:p>
-            <a:endParaRPr lang="he-IL" dirty="0"/>
-          </a:p>
-          <a:p>
-            <a:r>
-              <a:rPr lang="he-IL" dirty="0"/>
-              <a:t>הצלבת המידע הנ"ל עם המידע על המטופלים מהמחקר, ייצרה לנו </a:t>
-            </a:r>
-            <a:r>
-              <a:rPr lang="he-IL" dirty="0" err="1"/>
-              <a:t>דאטאבייס</a:t>
-            </a:r>
-            <a:r>
-              <a:rPr lang="he-IL" dirty="0"/>
-              <a:t> עם וקטור של הגנים שנדגמו אצל כל מטופל עם ערך 1 אם הגן עבר מוטציה ו-0 אם לא.</a:t>
+              <a:t> עם ערכים טבעיים.</a:t>
             </a:r>
             <a:endParaRPr lang="en-US" dirty="0"/>
           </a:p>
@@ -4427,8 +4493,8 @@
         </p:nvSpPr>
         <p:spPr>
           <a:xfrm>
-            <a:off x="4221563" y="601208"/>
-            <a:ext cx="5049780" cy="923330"/>
+            <a:off x="4024396" y="601208"/>
+            <a:ext cx="5444119" cy="923330"/>
           </a:xfrm>
           <a:prstGeom prst="rect">
             <a:avLst/>
@@ -4456,39 +4522,7 @@
                   </a:outerShdw>
                 </a:effectLst>
               </a:rPr>
-              <a:t>בניית </a:t>
-            </a:r>
-            <a:r>
-              <a:rPr lang="he-IL" sz="5400" dirty="0" err="1">
-                <a:ln w="0"/>
-                <a:solidFill>
-                  <a:schemeClr val="accent1"/>
-                </a:solidFill>
-                <a:effectLst>
-                  <a:outerShdw blurRad="38100" dist="25400" dir="5400000" algn="ctr" rotWithShape="0">
-                    <a:srgbClr val="6E747A">
-                      <a:alpha val="43000"/>
-                    </a:srgbClr>
-                  </a:outerShdw>
-                </a:effectLst>
-              </a:rPr>
-              <a:t>הדאטאבייס</a:t>
-            </a:r>
-            <a:r>
-              <a:rPr lang="he-IL" sz="5400" dirty="0">
-                <a:ln w="0"/>
-                <a:solidFill>
-                  <a:schemeClr val="accent1"/>
-                </a:solidFill>
-                <a:effectLst>
-                  <a:outerShdw blurRad="38100" dist="25400" dir="5400000" algn="ctr" rotWithShape="0">
-                    <a:srgbClr val="6E747A">
-                      <a:alpha val="43000"/>
-                    </a:srgbClr>
-                  </a:outerShdw>
-                </a:effectLst>
-              </a:rPr>
-              <a:t> </a:t>
+              <a:t>בניית המסד נתונים </a:t>
             </a:r>
             <a:endParaRPr lang="he-IL" sz="5400" b="0" cap="none" spc="0" dirty="0">
               <a:ln w="0"/>
@@ -4664,7 +4698,7 @@
         <p:spPr>
           <a:xfrm>
             <a:off x="2913469" y="1762813"/>
-            <a:ext cx="8399282" cy="1200329"/>
+            <a:ext cx="8399282" cy="1477328"/>
           </a:xfrm>
           <a:prstGeom prst="rect">
             <a:avLst/>
@@ -4687,15 +4721,31 @@
             </a:r>
             <a:r>
               <a:rPr lang="he-IL" dirty="0"/>
-              <a:t>. כל דגימה של פציינט עם וקטור הגנים </a:t>
+              <a:t>. כל דגימה של פציינט עם וקטור הגנים עדכנה את ערכי הצמתים, כאשר לכל </a:t>
+            </a:r>
+            <a:r>
+              <a:rPr lang="en-US" dirty="0"/>
+              <a:t>term</a:t>
+            </a:r>
+            <a:r>
+              <a:rPr lang="he-IL" dirty="0"/>
+              <a:t> אנו </a:t>
             </a:r>
             <a:r>
               <a:rPr lang="he-IL" dirty="0" err="1"/>
-              <a:t>עידכנה</a:t>
+              <a:t>סוכמים</a:t>
             </a:r>
             <a:r>
               <a:rPr lang="he-IL" dirty="0"/>
-              <a:t> את ערכי הצמתים. </a:t>
+              <a:t> את ערך הבנים(</a:t>
+            </a:r>
+            <a:r>
+              <a:rPr lang="en-US" dirty="0"/>
+              <a:t>bottom-up</a:t>
+            </a:r>
+            <a:r>
+              <a:rPr lang="he-IL" dirty="0"/>
+              <a:t>). </a:t>
             </a:r>
           </a:p>
           <a:p>

</xml_diff>